<commit_message>
correción de detalles en REPORTE_new
- Ortografía
- Font color
- Posición de algunos gráficos
</commit_message>
<xml_diff>
--- a/Entrega_1/00 - REPORTE/REPORTE_new.pptx
+++ b/Entrega_1/00 - REPORTE/REPORTE_new.pptx
@@ -2578,7 +2578,7 @@
                 <a:srgbClr val="002060"/>
               </a:solidFill>
             </a:rPr>
-            <a:t>Business </a:t>
+            <a:t>	Business </a:t>
           </a:r>
           <a:r>
             <a:rPr lang="es-ES" sz="900" b="1" dirty="0" err="1">
@@ -2638,7 +2638,7 @@
                 <a:srgbClr val="002060"/>
               </a:solidFill>
             </a:rPr>
-            <a:t>       Data </a:t>
+            <a:t>      	Data </a:t>
           </a:r>
           <a:r>
             <a:rPr lang="es-ES" sz="800" b="1" dirty="0" err="1">
@@ -2752,7 +2752,7 @@
                 <a:srgbClr val="002060"/>
               </a:solidFill>
             </a:rPr>
-            <a:t>         Data </a:t>
+            <a:t> 	Data </a:t>
           </a:r>
           <a:r>
             <a:rPr lang="es-ES" sz="800" b="1" dirty="0" err="1">
@@ -2871,7 +2871,7 @@
                 <a:srgbClr val="002060"/>
               </a:solidFill>
             </a:rPr>
-            <a:t>            </a:t>
+            <a:t>            	</a:t>
           </a:r>
           <a:r>
             <a:rPr lang="es-ES" sz="800" b="1" dirty="0" err="1">
@@ -2895,7 +2895,7 @@
                 <a:srgbClr val="002060"/>
               </a:solidFill>
             </a:rPr>
-            <a:t>Evaluatio</a:t>
+            <a:t>Evaluation</a:t>
           </a:r>
           <a:endParaRPr lang="es-ES" sz="800" b="1" dirty="0">
             <a:solidFill>
@@ -2906,7 +2906,7 @@
         <a:p>
           <a:r>
             <a:rPr lang="es-ES" sz="700" dirty="0"/>
-            <a:t>	      KNN – </a:t>
+            <a:t>	KNN – </a:t>
           </a:r>
           <a:r>
             <a:rPr lang="es-ES" sz="700" dirty="0" err="1"/>
@@ -2920,7 +2920,7 @@
         <a:p>
           <a:r>
             <a:rPr lang="es-ES" sz="700" dirty="0"/>
-            <a:t>                    </a:t>
+            <a:t>               </a:t>
           </a:r>
           <a:r>
             <a:rPr lang="es-ES" sz="700" dirty="0" err="1"/>
@@ -2939,7 +2939,7 @@
         <a:p>
           <a:r>
             <a:rPr lang="es-ES" sz="700" dirty="0"/>
-            <a:t>                    </a:t>
+            <a:t>               </a:t>
           </a:r>
           <a:r>
             <a:rPr lang="es-ES" sz="700" dirty="0" err="1"/>
@@ -2992,7 +2992,7 @@
                 <a:srgbClr val="002060"/>
               </a:solidFill>
             </a:rPr>
-            <a:t>            </a:t>
+            <a:t>            	</a:t>
           </a:r>
           <a:r>
             <a:rPr lang="es-ES" sz="800" b="1" dirty="0" err="1">
@@ -3416,7 +3416,7 @@
       <dgm:spPr/>
     </dgm:pt>
     <dgm:pt modelId="{259A7068-6F6F-9B4D-894D-518C62EBCA00}" type="pres">
-      <dgm:prSet presAssocID="{C1C1743D-B186-F748-A62C-FD5A8898EAD1}" presName="bigChev" presStyleLbl="node1" presStyleIdx="0" presStyleCnt="1" custAng="0" custScaleX="137387" custLinFactNeighborX="22410" custLinFactNeighborY="44"/>
+      <dgm:prSet presAssocID="{C1C1743D-B186-F748-A62C-FD5A8898EAD1}" presName="bigChev" presStyleLbl="node1" presStyleIdx="0" presStyleCnt="1" custAng="0" custScaleX="137387" custLinFactNeighborX="23488" custLinFactNeighborY="44"/>
       <dgm:spPr/>
     </dgm:pt>
   </dgm:ptLst>
@@ -3519,7 +3519,7 @@
                 <a:srgbClr val="002060"/>
               </a:solidFill>
             </a:rPr>
-            <a:t>Business </a:t>
+            <a:t>	Business </a:t>
           </a:r>
           <a:r>
             <a:rPr lang="es-ES" sz="900" b="1" kern="1200" dirty="0" err="1">
@@ -3670,7 +3670,7 @@
                 <a:srgbClr val="002060"/>
               </a:solidFill>
             </a:rPr>
-            <a:t>       Data </a:t>
+            <a:t>      	Data </a:t>
           </a:r>
           <a:r>
             <a:rPr lang="es-ES" sz="800" b="1" kern="1200" dirty="0" err="1">
@@ -3923,7 +3923,7 @@
                 <a:srgbClr val="002060"/>
               </a:solidFill>
             </a:rPr>
-            <a:t>         Data </a:t>
+            <a:t> 	Data </a:t>
           </a:r>
           <a:r>
             <a:rPr lang="es-ES" sz="800" b="1" kern="1200" dirty="0" err="1">
@@ -4169,7 +4169,7 @@
                 <a:srgbClr val="002060"/>
               </a:solidFill>
             </a:rPr>
-            <a:t>            </a:t>
+            <a:t>            	</a:t>
           </a:r>
           <a:r>
             <a:rPr lang="es-ES" sz="800" b="1" kern="1200" dirty="0" err="1">
@@ -4193,7 +4193,7 @@
                 <a:srgbClr val="002060"/>
               </a:solidFill>
             </a:rPr>
-            <a:t>Evaluatio</a:t>
+            <a:t>Evaluation</a:t>
           </a:r>
           <a:endParaRPr lang="es-ES" sz="800" b="1" kern="1200" dirty="0">
             <a:solidFill>
@@ -4216,7 +4216,7 @@
           </a:pPr>
           <a:r>
             <a:rPr lang="es-ES" sz="700" kern="1200" dirty="0"/>
-            <a:t>	      KNN – </a:t>
+            <a:t>	KNN – </a:t>
           </a:r>
           <a:r>
             <a:rPr lang="es-ES" sz="700" kern="1200" dirty="0" err="1"/>
@@ -4242,7 +4242,7 @@
           </a:pPr>
           <a:r>
             <a:rPr lang="es-ES" sz="700" kern="1200" dirty="0"/>
-            <a:t>                    </a:t>
+            <a:t>               </a:t>
           </a:r>
           <a:r>
             <a:rPr lang="es-ES" sz="700" kern="1200" dirty="0" err="1"/>
@@ -4273,7 +4273,7 @@
           </a:pPr>
           <a:r>
             <a:rPr lang="es-ES" sz="700" kern="1200" dirty="0"/>
-            <a:t>                    </a:t>
+            <a:t>               </a:t>
           </a:r>
           <a:r>
             <a:rPr lang="es-ES" sz="700" kern="1200" dirty="0" err="1"/>
@@ -4417,7 +4417,7 @@
                 <a:srgbClr val="002060"/>
               </a:solidFill>
             </a:rPr>
-            <a:t>            </a:t>
+            <a:t>            	</a:t>
           </a:r>
           <a:r>
             <a:rPr lang="es-ES" sz="800" b="1" kern="1200" dirty="0" err="1">
@@ -4603,8 +4603,8 @@
       </dsp:nvSpPr>
       <dsp:spPr>
         <a:xfrm>
-          <a:off x="593782" y="701"/>
-          <a:ext cx="1820148" cy="529933"/>
+          <a:off x="626215" y="327"/>
+          <a:ext cx="1822240" cy="530542"/>
         </a:xfrm>
         <a:prstGeom prst="chevron">
           <a:avLst/>
@@ -4674,8 +4674,8 @@
         </a:p>
       </dsp:txBody>
       <dsp:txXfrm>
-        <a:off x="858749" y="701"/>
-        <a:ext cx="1290215" cy="529933"/>
+        <a:off x="891486" y="327"/>
+        <a:ext cx="1291698" cy="530542"/>
       </dsp:txXfrm>
     </dsp:sp>
   </dsp:spTree>
@@ -17059,6 +17059,7 @@
             <a:endParaRPr lang="es-ES" dirty="0"/>
           </a:p>
           <a:p>
+            <a:pPr algn="just"/>
             <a:r>
               <a:rPr lang="es-ES" dirty="0"/>
               <a:t>Esta circunstancia derivó en la elección de un soporte mínimo extremadamente bajo, de modo que se pudiera obtener reglas significativas asociadas al abandono del banco. En los valores LIFT se podrá ver que el hecho de reducir el soporte no impide obtener reglas muy significativas que expliquen tendencias dentro de ese 20% de la muestra. </a:t>
@@ -17074,9 +17075,11 @@
             <a:endParaRPr lang="es-ES" b="1" i="1" dirty="0"/>
           </a:p>
           <a:p>
+            <a:pPr algn="just"/>
             <a:endParaRPr lang="es-ES" dirty="0"/>
           </a:p>
           <a:p>
+            <a:pPr algn="just"/>
             <a:r>
               <a:rPr lang="es-ES" dirty="0"/>
               <a:t>Esto también afecta a la elección de la confianza: Se ha escogido </a:t>
@@ -17998,7 +18001,7 @@
         </p:nvSpPr>
         <p:spPr>
           <a:xfrm>
-            <a:off x="4649663" y="3357394"/>
+            <a:off x="4649663" y="3336128"/>
             <a:ext cx="4431491" cy="1277273"/>
           </a:xfrm>
           <a:prstGeom prst="rect">
@@ -18213,11 +18216,19 @@
           <a:lstStyle/>
           <a:p>
             <a:r>
-              <a:rPr lang="es-ES" sz="1200" b="1" i="1" dirty="0"/>
+              <a:rPr lang="es-ES" sz="1200" b="1" i="1" dirty="0">
+                <a:solidFill>
+                  <a:schemeClr val="tx1"/>
+                </a:solidFill>
+              </a:rPr>
               <a:t>Variables declaradas previamente como significativas concuerdan con las que aparecen en las reglas más informativas: </a:t>
             </a:r>
             <a:r>
-              <a:rPr lang="es-ES" sz="1200" b="1" i="1" u="sng" dirty="0"/>
+              <a:rPr lang="es-ES" sz="1200" b="1" i="1" u="sng" dirty="0">
+                <a:solidFill>
+                  <a:schemeClr val="tx1"/>
+                </a:solidFill>
+              </a:rPr>
               <a:t>Validación de la significancia</a:t>
             </a:r>
           </a:p>
@@ -20413,14 +20424,14 @@
           <p:nvPr>
             <p:extLst>
               <p:ext uri="{D42A27DB-BD31-4B8C-83A1-F6EECF244321}">
-                <p14:modId xmlns:p14="http://schemas.microsoft.com/office/powerpoint/2010/main" val="1592414242"/>
+                <p14:modId xmlns:p14="http://schemas.microsoft.com/office/powerpoint/2010/main" val="4176453887"/>
               </p:ext>
             </p:extLst>
           </p:nvPr>
         </p:nvGraphicFramePr>
         <p:xfrm>
           <a:off x="-51798" y="2004664"/>
-          <a:ext cx="2413931" cy="530870"/>
+          <a:ext cx="2451603" cy="530870"/>
         </p:xfrm>
         <a:graphic>
           <a:graphicData uri="http://schemas.openxmlformats.org/drawingml/2006/diagram">
@@ -20442,7 +20453,7 @@
         </p:nvSpPr>
         <p:spPr>
           <a:xfrm>
-            <a:off x="7227390" y="1857521"/>
+            <a:off x="7098798" y="1771793"/>
             <a:ext cx="1916610" cy="453829"/>
           </a:xfrm>
           <a:prstGeom prst="leftArrow">
@@ -21125,10 +21136,10 @@
             <a:endParaRPr lang="en-GB" sz="1100" b="1" dirty="0"/>
           </a:p>
           <a:p>
-            <a:pPr marL="171450" indent="-171450">
-              <a:buFont typeface="Arial" panose="020B0604020202020204" pitchFamily="34" charset="0"/>
-              <a:buChar char="•"/>
-            </a:pPr>
+            <a:r>
+              <a:rPr lang="en-GB" sz="1100" b="1" dirty="0"/>
+              <a:t>     </a:t>
+            </a:r>
             <a:r>
               <a:rPr lang="en-GB" sz="1100" b="1" dirty="0" err="1"/>
               <a:t>estrategias</a:t>
@@ -22367,7 +22378,7 @@
           <p:nvPr>
             <p:extLst>
               <p:ext uri="{D42A27DB-BD31-4B8C-83A1-F6EECF244321}">
-                <p14:modId xmlns:p14="http://schemas.microsoft.com/office/powerpoint/2010/main" val="2616305180"/>
+                <p14:modId xmlns:p14="http://schemas.microsoft.com/office/powerpoint/2010/main" val="53099396"/>
               </p:ext>
             </p:extLst>
           </p:nvPr>
@@ -23362,7 +23373,7 @@
         <p:spPr>
           <a:xfrm>
             <a:off x="5891456" y="1183710"/>
-            <a:ext cx="2689411" cy="2000548"/>
+            <a:ext cx="2689411" cy="2154436"/>
           </a:xfrm>
           <a:prstGeom prst="rect">
             <a:avLst/>
@@ -23483,6 +23494,9 @@
               <a:rPr lang="en-GB" sz="1000" dirty="0" err="1"/>
               <a:t>derivadas</a:t>
             </a:r>
+            <a:endParaRPr lang="en-GB" sz="1000" dirty="0"/>
+          </a:p>
+          <a:p>
             <a:endParaRPr lang="en-GB" sz="1000" dirty="0"/>
           </a:p>
           <a:p>
@@ -24081,7 +24095,7 @@
         </p:nvSpPr>
         <p:spPr>
           <a:xfrm>
-            <a:off x="720000" y="184498"/>
+            <a:off x="720000" y="227362"/>
             <a:ext cx="7704000" cy="572700"/>
           </a:xfrm>
           <a:prstGeom prst="rect">
@@ -24786,8 +24800,8 @@
         </p:nvSpPr>
         <p:spPr>
           <a:xfrm>
-            <a:off x="4193978" y="3188307"/>
-            <a:ext cx="2589581" cy="1569660"/>
+            <a:off x="3855856" y="3456052"/>
+            <a:ext cx="5169717" cy="1015663"/>
           </a:xfrm>
           <a:prstGeom prst="rect">
             <a:avLst/>
@@ -24811,22 +24825,12 @@
             </a:r>
             <a:r>
               <a:rPr lang="es-ES" sz="1200" i="1" dirty="0"/>
-              <a:t> (multivariante), </a:t>
+              <a:t> (multivariante), llegamos a unos resultados muy buenos, encontrando un ajuste prácticamente perfecto de las distribuciones. </a:t>
             </a:r>
           </a:p>
           <a:p>
             <a:pPr algn="just"/>
-            <a:r>
-              <a:rPr lang="es-ES" sz="1200" i="1" dirty="0"/>
-              <a:t>llegamos a unos resultados muy buenos, encontrando </a:t>
-            </a:r>
-          </a:p>
-          <a:p>
-            <a:pPr algn="just"/>
-            <a:r>
-              <a:rPr lang="es-ES" sz="1200" i="1" dirty="0"/>
-              <a:t>un ajuste prácticamente perfecto de las distribuciones. </a:t>
-            </a:r>
+            <a:endParaRPr lang="es-ES" sz="1200" i="1" dirty="0"/>
           </a:p>
           <a:p>
             <a:pPr algn="just"/>

</xml_diff>

<commit_message>
pequeño cambio reporte: outliers
</commit_message>
<xml_diff>
--- a/Entrega_1/00 - REPORTE/REPORTE_new.pptx
+++ b/Entrega_1/00 - REPORTE/REPORTE_new.pptx
@@ -28,33 +28,33 @@
   <p:notesSz cx="6858000" cy="9144000"/>
   <p:embeddedFontLst>
     <p:embeddedFont>
-      <p:font typeface="Arial Black" panose="020B0604020202020204" pitchFamily="34" charset="0"/>
+      <p:font typeface="Arial Black" panose="020B0A04020102020204" pitchFamily="34" charset="0"/>
       <p:bold r:id="rId18"/>
     </p:embeddedFont>
     <p:embeddedFont>
-      <p:font typeface="Arial Rounded MT Bold" panose="020F0704030504030204" pitchFamily="34" charset="77"/>
+      <p:font typeface="Arial Rounded MT Bold" panose="020F0704030504030204" pitchFamily="34" charset="0"/>
       <p:regular r:id="rId19"/>
     </p:embeddedFont>
     <p:embeddedFont>
-      <p:font typeface="Didact Gothic" pitchFamily="2" charset="0"/>
+      <p:font typeface="Didact Gothic" panose="00000500000000000000" pitchFamily="2" charset="0"/>
       <p:regular r:id="rId20"/>
     </p:embeddedFont>
     <p:embeddedFont>
-      <p:font typeface="Libre Franklin" pitchFamily="2" charset="77"/>
+      <p:font typeface="Libre Franklin" pitchFamily="2" charset="0"/>
       <p:regular r:id="rId21"/>
       <p:bold r:id="rId22"/>
       <p:italic r:id="rId23"/>
       <p:boldItalic r:id="rId24"/>
     </p:embeddedFont>
     <p:embeddedFont>
-      <p:font typeface="Poppins" pitchFamily="2" charset="77"/>
+      <p:font typeface="Poppins" panose="00000500000000000000" pitchFamily="2" charset="0"/>
       <p:regular r:id="rId25"/>
       <p:bold r:id="rId26"/>
       <p:italic r:id="rId27"/>
       <p:boldItalic r:id="rId28"/>
     </p:embeddedFont>
     <p:embeddedFont>
-      <p:font typeface="Raleway" pitchFamily="2" charset="77"/>
+      <p:font typeface="Raleway" pitchFamily="2" charset="0"/>
       <p:regular r:id="rId29"/>
       <p:bold r:id="rId30"/>
       <p:italic r:id="rId31"/>
@@ -308,6 +308,35 @@
     </p:extLst>
   </p:cmAuthor>
 </p:cmAuthorLst>
+</file>
+
+<file path=ppt/changesInfos/changesInfo1.xml><?xml version="1.0" encoding="utf-8"?>
+<pc:chgInfo xmlns:a="http://schemas.openxmlformats.org/drawingml/2006/main" xmlns:r="http://schemas.openxmlformats.org/officeDocument/2006/relationships" xmlns:ac="http://schemas.microsoft.com/office/drawing/2013/main/command" xmlns:pc="http://schemas.microsoft.com/office/powerpoint/2013/main/command">
+  <pc:docChgLst>
+    <pc:chgData name="Mario Aragón Valderrama" userId="ab42593c9091a3c7" providerId="LiveId" clId="{A94EC9C8-FC2E-45B4-829C-AEB6B286F687}"/>
+    <pc:docChg chg="modSld">
+      <pc:chgData name="Mario Aragón Valderrama" userId="ab42593c9091a3c7" providerId="LiveId" clId="{A94EC9C8-FC2E-45B4-829C-AEB6B286F687}" dt="2025-11-10T11:24:48.369" v="208" actId="20577"/>
+      <pc:docMkLst>
+        <pc:docMk/>
+      </pc:docMkLst>
+      <pc:sldChg chg="modSp mod">
+        <pc:chgData name="Mario Aragón Valderrama" userId="ab42593c9091a3c7" providerId="LiveId" clId="{A94EC9C8-FC2E-45B4-829C-AEB6B286F687}" dt="2025-11-10T11:24:48.369" v="208" actId="20577"/>
+        <pc:sldMkLst>
+          <pc:docMk/>
+          <pc:sldMk cId="3535935293" sldId="291"/>
+        </pc:sldMkLst>
+        <pc:spChg chg="mod">
+          <ac:chgData name="Mario Aragón Valderrama" userId="ab42593c9091a3c7" providerId="LiveId" clId="{A94EC9C8-FC2E-45B4-829C-AEB6B286F687}" dt="2025-11-10T11:24:48.369" v="208" actId="20577"/>
+          <ac:spMkLst>
+            <pc:docMk/>
+            <pc:sldMk cId="3535935293" sldId="291"/>
+            <ac:spMk id="3" creationId="{2EEF3947-4909-7EA1-9CA3-22FEB8ED7AAA}"/>
+          </ac:spMkLst>
+        </pc:spChg>
+      </pc:sldChg>
+    </pc:docChg>
+  </pc:docChgLst>
+</pc:chgInfo>
 </file>
 
 <file path=ppt/diagrams/colors1.xml><?xml version="1.0" encoding="utf-8"?>
@@ -24935,8 +24964,8 @@
         </p:nvSpPr>
         <p:spPr>
           <a:xfrm>
-            <a:off x="314554" y="4231644"/>
-            <a:ext cx="7642400" cy="430887"/>
+            <a:off x="299922" y="4096818"/>
+            <a:ext cx="8306195" cy="938719"/>
           </a:xfrm>
           <a:prstGeom prst="rect">
             <a:avLst/>
@@ -24984,24 +25013,38 @@
                   <a:schemeClr val="tx1"/>
                 </a:solidFill>
               </a:rPr>
-              <a:t> previo y posterior a la imputación, obteniendo los mismos resultados tanto a nivel univariante como multivariante, por lo que se decidió no tratar los </a:t>
-            </a:r>
-            <a:r>
-              <a:rPr lang="es-ES" sz="1100" dirty="0" err="1">
-                <a:solidFill>
-                  <a:schemeClr val="tx1"/>
-                </a:solidFill>
-              </a:rPr>
-              <a:t>outliers</a:t>
-            </a:r>
+              <a:t> previo y posterior a la imputación, obteniendo los mismos resultados tanto a nivel univariante como multivariante.</a:t>
+            </a:r>
+          </a:p>
+          <a:p>
+            <a:endParaRPr lang="es-ES" sz="1100" dirty="0">
+              <a:solidFill>
+                <a:schemeClr val="tx1"/>
+              </a:solidFill>
+            </a:endParaRPr>
+          </a:p>
+          <a:p>
             <a:r>
               <a:rPr lang="es-ES" sz="1100" dirty="0">
                 <a:solidFill>
                   <a:schemeClr val="tx1"/>
                 </a:solidFill>
               </a:rPr>
-              <a:t> y aceptarlos como fruto de la normalidad</a:t>
-            </a:r>
+              <a:t>Se decidió mantenerlos en la base de datos, ya que suponían una proporción que se puede entender como normal (~4-5%) y no se observaron valores extremos </a:t>
+            </a:r>
+            <a:r>
+              <a:rPr lang="es-ES" sz="1100">
+                <a:solidFill>
+                  <a:schemeClr val="tx1"/>
+                </a:solidFill>
+              </a:rPr>
+              <a:t>o imposibles.</a:t>
+            </a:r>
+            <a:endParaRPr lang="es-ES" sz="1100" dirty="0">
+              <a:solidFill>
+                <a:schemeClr val="tx1"/>
+              </a:solidFill>
+            </a:endParaRPr>
           </a:p>
         </p:txBody>
       </p:sp>

</xml_diff>